<commit_message>
Atualização de projeto, projeto entregue a primeiraparte.
</commit_message>
<xml_diff>
--- a/TCC/Apresentação TCC.pptx
+++ b/TCC/Apresentação TCC.pptx
@@ -10,11 +10,10 @@
     <p:sldId id="267" r:id="rId4"/>
     <p:sldId id="258" r:id="rId5"/>
     <p:sldId id="259" r:id="rId6"/>
-    <p:sldId id="264" r:id="rId7"/>
-    <p:sldId id="262" r:id="rId8"/>
-    <p:sldId id="260" r:id="rId9"/>
-    <p:sldId id="263" r:id="rId10"/>
-    <p:sldId id="261" r:id="rId11"/>
+    <p:sldId id="262" r:id="rId7"/>
+    <p:sldId id="260" r:id="rId8"/>
+    <p:sldId id="263" r:id="rId9"/>
+    <p:sldId id="261" r:id="rId10"/>
   </p:sldIdLst>
   <p:sldSz cx="9144000" cy="6858000" type="screen4x3"/>
   <p:notesSz cx="6858000" cy="9144000"/>
@@ -113,6 +112,22 @@
       </a:defRPr>
     </a:lvl9pPr>
   </p:defaultTextStyle>
+  <p:extLst>
+    <p:ext uri="{EFAFB233-063F-42B5-8137-9DF3F51BA10A}">
+      <p15:sldGuideLst xmlns:p15="http://schemas.microsoft.com/office/powerpoint/2012/main">
+        <p15:guide id="1" orient="horz" pos="2160">
+          <p15:clr>
+            <a:srgbClr val="A4A3A4"/>
+          </p15:clr>
+        </p15:guide>
+        <p15:guide id="2" pos="2880">
+          <p15:clr>
+            <a:srgbClr val="A4A3A4"/>
+          </p15:clr>
+        </p15:guide>
+      </p15:sldGuideLst>
+    </p:ext>
+  </p:extLst>
 </p:presentation>
 </file>
 
@@ -396,7 +411,7 @@
           <a:p>
             <a:fld id="{899BE81A-C760-45F3-A209-85AC4DD73551}" type="datetimeFigureOut">
               <a:rPr lang="pt-BR" smtClean="0"/>
-              <a:t>26/06/2015</a:t>
+              <a:t>10/12/2015</a:t>
             </a:fld>
             <a:endParaRPr lang="pt-BR" dirty="0"/>
           </a:p>
@@ -789,7 +804,7 @@
           <a:p>
             <a:fld id="{899BE81A-C760-45F3-A209-85AC4DD73551}" type="datetimeFigureOut">
               <a:rPr lang="pt-BR" smtClean="0"/>
-              <a:t>26/06/2015</a:t>
+              <a:t>10/12/2015</a:t>
             </a:fld>
             <a:endParaRPr lang="pt-BR" dirty="0"/>
           </a:p>
@@ -1321,7 +1336,7 @@
           <a:p>
             <a:fld id="{899BE81A-C760-45F3-A209-85AC4DD73551}" type="datetimeFigureOut">
               <a:rPr lang="pt-BR" smtClean="0"/>
-              <a:t>26/06/2015</a:t>
+              <a:t>10/12/2015</a:t>
             </a:fld>
             <a:endParaRPr lang="pt-BR" dirty="0"/>
           </a:p>
@@ -1454,7 +1469,7 @@
           <a:p>
             <a:fld id="{899BE81A-C760-45F3-A209-85AC4DD73551}" type="datetimeFigureOut">
               <a:rPr lang="pt-BR" smtClean="0"/>
-              <a:t>26/06/2015</a:t>
+              <a:t>10/12/2015</a:t>
             </a:fld>
             <a:endParaRPr lang="pt-BR" dirty="0"/>
           </a:p>
@@ -1997,7 +2012,7 @@
           <a:p>
             <a:fld id="{899BE81A-C760-45F3-A209-85AC4DD73551}" type="datetimeFigureOut">
               <a:rPr lang="pt-BR" smtClean="0"/>
-              <a:t>26/06/2015</a:t>
+              <a:t>10/12/2015</a:t>
             </a:fld>
             <a:endParaRPr lang="pt-BR" dirty="0"/>
           </a:p>
@@ -2292,7 +2307,7 @@
           <a:p>
             <a:fld id="{899BE81A-C760-45F3-A209-85AC4DD73551}" type="datetimeFigureOut">
               <a:rPr lang="pt-BR" smtClean="0"/>
-              <a:t>26/06/2015</a:t>
+              <a:t>10/12/2015</a:t>
             </a:fld>
             <a:endParaRPr lang="pt-BR" dirty="0"/>
           </a:p>
@@ -2951,7 +2966,7 @@
           <a:p>
             <a:fld id="{899BE81A-C760-45F3-A209-85AC4DD73551}" type="datetimeFigureOut">
               <a:rPr lang="pt-BR" smtClean="0"/>
-              <a:t>26/06/2015</a:t>
+              <a:t>10/12/2015</a:t>
             </a:fld>
             <a:endParaRPr lang="pt-BR" dirty="0"/>
           </a:p>
@@ -3387,7 +3402,7 @@
           <a:p>
             <a:fld id="{899BE81A-C760-45F3-A209-85AC4DD73551}" type="datetimeFigureOut">
               <a:rPr lang="pt-BR" smtClean="0"/>
-              <a:t>26/06/2015</a:t>
+              <a:t>10/12/2015</a:t>
             </a:fld>
             <a:endParaRPr lang="pt-BR" dirty="0"/>
           </a:p>
@@ -3700,7 +3715,7 @@
           <a:p>
             <a:fld id="{899BE81A-C760-45F3-A209-85AC4DD73551}" type="datetimeFigureOut">
               <a:rPr lang="pt-BR" smtClean="0"/>
-              <a:t>26/06/2015</a:t>
+              <a:t>10/12/2015</a:t>
             </a:fld>
             <a:endParaRPr lang="pt-BR" dirty="0"/>
           </a:p>
@@ -4432,7 +4447,7 @@
           <a:p>
             <a:fld id="{899BE81A-C760-45F3-A209-85AC4DD73551}" type="datetimeFigureOut">
               <a:rPr lang="pt-BR" smtClean="0"/>
-              <a:t>26/06/2015</a:t>
+              <a:t>10/12/2015</a:t>
             </a:fld>
             <a:endParaRPr lang="pt-BR" dirty="0"/>
           </a:p>
@@ -5096,7 +5111,7 @@
           <a:p>
             <a:fld id="{899BE81A-C760-45F3-A209-85AC4DD73551}" type="datetimeFigureOut">
               <a:rPr lang="pt-BR" smtClean="0"/>
-              <a:t>26/06/2015</a:t>
+              <a:t>10/12/2015</a:t>
             </a:fld>
             <a:endParaRPr lang="pt-BR" dirty="0"/>
           </a:p>
@@ -5369,7 +5384,7 @@
           <a:p>
             <a:fld id="{899BE81A-C760-45F3-A209-85AC4DD73551}" type="datetimeFigureOut">
               <a:rPr lang="pt-BR" smtClean="0"/>
-              <a:t>26/06/2015</a:t>
+              <a:t>10/12/2015</a:t>
             </a:fld>
             <a:endParaRPr lang="pt-BR" dirty="0"/>
           </a:p>
@@ -6547,73 +6562,6 @@
 </p:sld>
 </file>
 
-<file path=ppt/slides/slide10.xml><?xml version="1.0" encoding="utf-8"?>
-<p:sld xmlns:a="http://schemas.openxmlformats.org/drawingml/2006/main" xmlns:r="http://schemas.openxmlformats.org/officeDocument/2006/relationships" xmlns:p="http://schemas.openxmlformats.org/presentationml/2006/main">
-  <p:cSld>
-    <p:spTree>
-      <p:nvGrpSpPr>
-        <p:cNvPr id="1" name=""/>
-        <p:cNvGrpSpPr/>
-        <p:nvPr/>
-      </p:nvGrpSpPr>
-      <p:grpSpPr>
-        <a:xfrm>
-          <a:off x="0" y="0"/>
-          <a:ext cx="0" cy="0"/>
-          <a:chOff x="0" y="0"/>
-          <a:chExt cx="0" cy="0"/>
-        </a:xfrm>
-      </p:grpSpPr>
-      <p:pic>
-        <p:nvPicPr>
-          <p:cNvPr id="6" name="Imagem 5"/>
-          <p:cNvPicPr>
-            <a:picLocks noChangeAspect="1"/>
-          </p:cNvPicPr>
-          <p:nvPr/>
-        </p:nvPicPr>
-        <p:blipFill>
-          <a:blip r:embed="rId2">
-            <a:extLst>
-              <a:ext uri="{28A0092B-C50C-407E-A947-70E740481C1C}">
-                <a14:useLocalDpi xmlns:a14="http://schemas.microsoft.com/office/drawing/2010/main" val="0"/>
-              </a:ext>
-            </a:extLst>
-          </a:blip>
-          <a:stretch>
-            <a:fillRect/>
-          </a:stretch>
-        </p:blipFill>
-        <p:spPr>
-          <a:xfrm>
-            <a:off x="107504" y="98512"/>
-            <a:ext cx="8872008" cy="6570848"/>
-          </a:xfrm>
-          <a:prstGeom prst="rect">
-            <a:avLst/>
-          </a:prstGeom>
-        </p:spPr>
-      </p:pic>
-    </p:spTree>
-    <p:extLst>
-      <p:ext uri="{BB962C8B-B14F-4D97-AF65-F5344CB8AC3E}">
-        <p14:creationId xmlns:p14="http://schemas.microsoft.com/office/powerpoint/2010/main" val="1021795620"/>
-      </p:ext>
-    </p:extLst>
-  </p:cSld>
-  <p:clrMapOvr>
-    <a:masterClrMapping/>
-  </p:clrMapOvr>
-  <p:timing>
-    <p:tnLst>
-      <p:par>
-        <p:cTn id="1" dur="indefinite" restart="never" nodeType="tmRoot"/>
-      </p:par>
-    </p:tnLst>
-  </p:timing>
-</p:sld>
-</file>
-
 <file path=ppt/slides/slide2.xml><?xml version="1.0" encoding="utf-8"?>
 <p:sld xmlns:a="http://schemas.openxmlformats.org/drawingml/2006/main" xmlns:r="http://schemas.openxmlformats.org/officeDocument/2006/relationships" xmlns:p="http://schemas.openxmlformats.org/presentationml/2006/main">
   <p:cSld>
@@ -7224,70 +7172,115 @@
           <a:lstStyle/>
           <a:p>
             <a:r>
-              <a:rPr lang="pt-BR" sz="4400" dirty="0" smtClean="0">
+              <a:rPr lang="pt-BR" sz="4800" b="1" dirty="0">
                 <a:solidFill>
                   <a:schemeClr val="tx1"/>
                 </a:solidFill>
                 <a:latin typeface="Arial" pitchFamily="34" charset="0"/>
                 <a:cs typeface="Arial" pitchFamily="34" charset="0"/>
               </a:rPr>
-              <a:t>Fluxo do Software</a:t>
-            </a:r>
-            <a:endParaRPr lang="pt-BR" sz="4400" dirty="0">
-              <a:solidFill>
-                <a:schemeClr val="tx1"/>
-              </a:solidFill>
+              <a:t>MER</a:t>
+            </a:r>
+            <a:endParaRPr lang="pt-BR" sz="4800" b="1" dirty="0">
               <a:latin typeface="Arial" pitchFamily="34" charset="0"/>
               <a:cs typeface="Arial" pitchFamily="34" charset="0"/>
             </a:endParaRPr>
           </a:p>
         </p:txBody>
       </p:sp>
-      <p:pic>
-        <p:nvPicPr>
-          <p:cNvPr id="5122" name="Picture 2" descr="C:\Users\DOUGLAS\Desktop\Activity Diagram0.png"/>
-          <p:cNvPicPr>
-            <a:picLocks noChangeAspect="1" noChangeArrowheads="1"/>
-          </p:cNvPicPr>
-          <p:nvPr/>
-        </p:nvPicPr>
-        <p:blipFill>
-          <a:blip r:embed="rId2">
-            <a:extLst>
-              <a:ext uri="{28A0092B-C50C-407E-A947-70E740481C1C}">
-                <a14:useLocalDpi xmlns:a14="http://schemas.microsoft.com/office/drawing/2010/main" val="0"/>
-              </a:ext>
-            </a:extLst>
-          </a:blip>
-          <a:srcRect/>
-          <a:stretch>
-            <a:fillRect/>
-          </a:stretch>
-        </p:blipFill>
-        <p:spPr bwMode="auto">
-          <a:xfrm>
-            <a:off x="0" y="-22225"/>
-            <a:ext cx="9144000" cy="6904038"/>
-          </a:xfrm>
-          <a:prstGeom prst="rect">
-            <a:avLst/>
-          </a:prstGeom>
-          <a:noFill/>
-          <a:extLst>
-            <a:ext uri="{909E8E84-426E-40DD-AFC4-6F175D3DCCD1}">
-              <a14:hiddenFill xmlns:a14="http://schemas.microsoft.com/office/drawing/2010/main">
-                <a:solidFill>
-                  <a:srgbClr val="FFFFFF"/>
-                </a:solidFill>
-              </a14:hiddenFill>
-            </a:ext>
-          </a:extLst>
-        </p:spPr>
-      </p:pic>
+      <p:sp>
+        <p:nvSpPr>
+          <p:cNvPr id="3" name="Espaço Reservado para Conteúdo 2"/>
+          <p:cNvSpPr>
+            <a:spLocks noGrp="1"/>
+          </p:cNvSpPr>
+          <p:nvPr>
+            <p:ph sz="quarter" idx="1"/>
+          </p:nvPr>
+        </p:nvSpPr>
+        <p:spPr/>
+        <p:txBody>
+          <a:bodyPr>
+            <a:normAutofit/>
+          </a:bodyPr>
+          <a:lstStyle/>
+          <a:p>
+            <a:pPr marL="0" indent="0" algn="ctr">
+              <a:buNone/>
+            </a:pPr>
+            <a:r>
+              <a:rPr lang="pt-BR" sz="3600" b="1" dirty="0" smtClean="0">
+                <a:latin typeface="Arial" pitchFamily="34" charset="0"/>
+                <a:cs typeface="Arial" pitchFamily="34" charset="0"/>
+              </a:rPr>
+              <a:t>MER – Modelo </a:t>
+            </a:r>
+            <a:r>
+              <a:rPr lang="pt-BR" sz="3600" b="1" dirty="0">
+                <a:latin typeface="Arial" pitchFamily="34" charset="0"/>
+                <a:cs typeface="Arial" pitchFamily="34" charset="0"/>
+              </a:rPr>
+              <a:t>E</a:t>
+            </a:r>
+            <a:r>
+              <a:rPr lang="pt-BR" sz="3600" b="1" dirty="0" smtClean="0">
+                <a:latin typeface="Arial" pitchFamily="34" charset="0"/>
+                <a:cs typeface="Arial" pitchFamily="34" charset="0"/>
+              </a:rPr>
+              <a:t>ntidade Relacionamento</a:t>
+            </a:r>
+          </a:p>
+          <a:p>
+            <a:pPr marL="0" indent="0" algn="ctr">
+              <a:buNone/>
+            </a:pPr>
+            <a:endParaRPr lang="pt-BR" sz="3200" dirty="0" smtClean="0">
+              <a:latin typeface="Arial" pitchFamily="34" charset="0"/>
+              <a:cs typeface="Arial" pitchFamily="34" charset="0"/>
+            </a:endParaRPr>
+          </a:p>
+          <a:p>
+            <a:r>
+              <a:rPr lang="pt-BR" sz="3600" dirty="0" smtClean="0">
+                <a:latin typeface="Arial" pitchFamily="34" charset="0"/>
+                <a:cs typeface="Arial" pitchFamily="34" charset="0"/>
+              </a:rPr>
+              <a:t>Comportamento dos dados</a:t>
+            </a:r>
+          </a:p>
+          <a:p>
+            <a:r>
+              <a:rPr lang="pt-BR" sz="3600" dirty="0" smtClean="0">
+                <a:latin typeface="Arial" pitchFamily="34" charset="0"/>
+                <a:cs typeface="Arial" pitchFamily="34" charset="0"/>
+              </a:rPr>
+              <a:t>Manipulação dos dados</a:t>
+            </a:r>
+          </a:p>
+          <a:p>
+            <a:r>
+              <a:rPr lang="pt-BR" sz="3600" dirty="0" smtClean="0">
+                <a:latin typeface="Arial" pitchFamily="34" charset="0"/>
+                <a:cs typeface="Arial" pitchFamily="34" charset="0"/>
+              </a:rPr>
+              <a:t>3° Forma Normal</a:t>
+            </a:r>
+          </a:p>
+          <a:p>
+            <a:r>
+              <a:rPr lang="pt-BR" sz="3600" dirty="0" smtClean="0">
+                <a:latin typeface="Arial" pitchFamily="34" charset="0"/>
+                <a:cs typeface="Arial" pitchFamily="34" charset="0"/>
+              </a:rPr>
+              <a:t>Persistência no banco e dados</a:t>
+            </a:r>
+          </a:p>
+        </p:txBody>
+      </p:sp>
     </p:spTree>
     <p:extLst>
       <p:ext uri="{BB962C8B-B14F-4D97-AF65-F5344CB8AC3E}">
-        <p14:creationId xmlns:p14="http://schemas.microsoft.com/office/powerpoint/2010/main" val="691584525"/>
+        <p14:creationId xmlns:p14="http://schemas.microsoft.com/office/powerpoint/2010/main" val="2557908757"/>
       </p:ext>
     </p:extLst>
   </p:cSld>
@@ -7339,7 +7332,7 @@
           <a:lstStyle/>
           <a:p>
             <a:r>
-              <a:rPr lang="pt-BR" sz="4800" b="1" dirty="0">
+              <a:rPr lang="pt-BR" sz="5400" b="1" dirty="0" smtClean="0">
                 <a:solidFill>
                   <a:schemeClr val="tx1"/>
                 </a:solidFill>
@@ -7348,106 +7341,50 @@
               </a:rPr>
               <a:t>MER</a:t>
             </a:r>
-            <a:endParaRPr lang="pt-BR" sz="4800" b="1" dirty="0">
+            <a:endParaRPr lang="pt-BR" sz="5400" b="1" dirty="0">
+              <a:solidFill>
+                <a:schemeClr val="tx1"/>
+              </a:solidFill>
               <a:latin typeface="Arial" pitchFamily="34" charset="0"/>
               <a:cs typeface="Arial" pitchFamily="34" charset="0"/>
             </a:endParaRPr>
           </a:p>
         </p:txBody>
       </p:sp>
-      <p:sp>
-        <p:nvSpPr>
-          <p:cNvPr id="3" name="Espaço Reservado para Conteúdo 2"/>
-          <p:cNvSpPr>
-            <a:spLocks noGrp="1"/>
-          </p:cNvSpPr>
-          <p:nvPr>
-            <p:ph sz="quarter" idx="1"/>
-          </p:nvPr>
-        </p:nvSpPr>
-        <p:spPr/>
-        <p:txBody>
-          <a:bodyPr>
-            <a:normAutofit/>
-          </a:bodyPr>
-          <a:lstStyle/>
-          <a:p>
-            <a:pPr marL="0" indent="0" algn="ctr">
-              <a:buNone/>
-            </a:pPr>
-            <a:r>
-              <a:rPr lang="pt-BR" sz="3600" b="1" dirty="0" smtClean="0">
-                <a:latin typeface="Arial" pitchFamily="34" charset="0"/>
-                <a:cs typeface="Arial" pitchFamily="34" charset="0"/>
-              </a:rPr>
-              <a:t>MER – Modelo </a:t>
-            </a:r>
-            <a:r>
-              <a:rPr lang="pt-BR" sz="3600" b="1" dirty="0">
-                <a:latin typeface="Arial" pitchFamily="34" charset="0"/>
-                <a:cs typeface="Arial" pitchFamily="34" charset="0"/>
-              </a:rPr>
-              <a:t>E</a:t>
-            </a:r>
-            <a:r>
-              <a:rPr lang="pt-BR" sz="3600" b="1" dirty="0" smtClean="0">
-                <a:latin typeface="Arial" pitchFamily="34" charset="0"/>
-                <a:cs typeface="Arial" pitchFamily="34" charset="0"/>
-              </a:rPr>
-              <a:t>ntidade Relacionamento</a:t>
-            </a:r>
-          </a:p>
-          <a:p>
-            <a:pPr marL="0" indent="0" algn="ctr">
-              <a:buNone/>
-            </a:pPr>
-            <a:endParaRPr lang="pt-BR" sz="3200" dirty="0" smtClean="0">
-              <a:latin typeface="Arial" pitchFamily="34" charset="0"/>
-              <a:cs typeface="Arial" pitchFamily="34" charset="0"/>
-            </a:endParaRPr>
-          </a:p>
-          <a:p>
-            <a:r>
-              <a:rPr lang="pt-BR" sz="3600" dirty="0" smtClean="0">
-                <a:latin typeface="Arial" pitchFamily="34" charset="0"/>
-                <a:cs typeface="Arial" pitchFamily="34" charset="0"/>
-              </a:rPr>
-              <a:t>Comportamento dos dados</a:t>
-            </a:r>
-          </a:p>
-          <a:p>
-            <a:r>
-              <a:rPr lang="pt-BR" sz="3600" dirty="0" smtClean="0">
-                <a:latin typeface="Arial" pitchFamily="34" charset="0"/>
-                <a:cs typeface="Arial" pitchFamily="34" charset="0"/>
-              </a:rPr>
-              <a:t>Manipulação dos dados</a:t>
-            </a:r>
-          </a:p>
-          <a:p>
-            <a:r>
-              <a:rPr lang="pt-BR" sz="3600" dirty="0" smtClean="0">
-                <a:latin typeface="Arial" pitchFamily="34" charset="0"/>
-                <a:cs typeface="Arial" pitchFamily="34" charset="0"/>
-              </a:rPr>
-              <a:t>3° Forma Normal</a:t>
-            </a:r>
-          </a:p>
-          <a:p>
-            <a:r>
-              <a:rPr lang="pt-BR" sz="3600" dirty="0" smtClean="0">
-                <a:latin typeface="Arial" pitchFamily="34" charset="0"/>
-                <a:cs typeface="Arial" pitchFamily="34" charset="0"/>
-              </a:rPr>
-              <a:t>Persistência no banco e dados</a:t>
-            </a:r>
-          </a:p>
-        </p:txBody>
-      </p:sp>
+      <p:pic>
+        <p:nvPicPr>
+          <p:cNvPr id="4" name="Imagem 3"/>
+          <p:cNvPicPr>
+            <a:picLocks noChangeAspect="1"/>
+          </p:cNvPicPr>
+          <p:nvPr/>
+        </p:nvPicPr>
+        <p:blipFill>
+          <a:blip r:embed="rId2">
+            <a:extLst>
+              <a:ext uri="{28A0092B-C50C-407E-A947-70E740481C1C}">
+                <a14:useLocalDpi xmlns:a14="http://schemas.microsoft.com/office/drawing/2010/main" val="0"/>
+              </a:ext>
+            </a:extLst>
+          </a:blip>
+          <a:stretch>
+            <a:fillRect/>
+          </a:stretch>
+        </p:blipFill>
+        <p:spPr>
+          <a:xfrm>
+            <a:off x="3769" y="0"/>
+            <a:ext cx="9083021" cy="6858000"/>
+          </a:xfrm>
+          <a:prstGeom prst="rect">
+            <a:avLst/>
+          </a:prstGeom>
+        </p:spPr>
+      </p:pic>
     </p:spTree>
     <p:extLst>
       <p:ext uri="{BB962C8B-B14F-4D97-AF65-F5344CB8AC3E}">
-        <p14:creationId xmlns:p14="http://schemas.microsoft.com/office/powerpoint/2010/main" val="2557908757"/>
+        <p14:creationId xmlns:p14="http://schemas.microsoft.com/office/powerpoint/2010/main" val="647338555"/>
       </p:ext>
     </p:extLst>
   </p:cSld>
@@ -7499,59 +7436,76 @@
           <a:lstStyle/>
           <a:p>
             <a:r>
-              <a:rPr lang="pt-BR" sz="5400" b="1" dirty="0" smtClean="0">
+              <a:rPr lang="pt-BR" sz="4800" b="1" dirty="0" smtClean="0">
                 <a:solidFill>
                   <a:schemeClr val="tx1"/>
                 </a:solidFill>
+              </a:rPr>
+              <a:t>Diagrama de Caso de Uso</a:t>
+            </a:r>
+            <a:endParaRPr lang="pt-BR" sz="4800" b="1" dirty="0">
+              <a:solidFill>
+                <a:schemeClr val="tx1"/>
+              </a:solidFill>
+            </a:endParaRPr>
+          </a:p>
+        </p:txBody>
+      </p:sp>
+      <p:sp>
+        <p:nvSpPr>
+          <p:cNvPr id="3" name="Espaço Reservado para Conteúdo 2"/>
+          <p:cNvSpPr>
+            <a:spLocks noGrp="1"/>
+          </p:cNvSpPr>
+          <p:nvPr>
+            <p:ph sz="quarter" idx="1"/>
+          </p:nvPr>
+        </p:nvSpPr>
+        <p:spPr/>
+        <p:txBody>
+          <a:bodyPr>
+            <a:normAutofit/>
+          </a:bodyPr>
+          <a:lstStyle/>
+          <a:p>
+            <a:endParaRPr lang="pt-BR" sz="3600" dirty="0" smtClean="0">
+              <a:latin typeface="Arial" pitchFamily="34" charset="0"/>
+              <a:cs typeface="Arial" pitchFamily="34" charset="0"/>
+            </a:endParaRPr>
+          </a:p>
+          <a:p>
+            <a:r>
+              <a:rPr lang="pt-BR" sz="4000" dirty="0" smtClean="0">
                 <a:latin typeface="Arial" pitchFamily="34" charset="0"/>
                 <a:cs typeface="Arial" pitchFamily="34" charset="0"/>
               </a:rPr>
-              <a:t>MER</a:t>
-            </a:r>
-            <a:endParaRPr lang="pt-BR" sz="5400" b="1" dirty="0">
-              <a:solidFill>
-                <a:schemeClr val="tx1"/>
-              </a:solidFill>
-              <a:latin typeface="Arial" pitchFamily="34" charset="0"/>
-              <a:cs typeface="Arial" pitchFamily="34" charset="0"/>
-            </a:endParaRPr>
-          </a:p>
-        </p:txBody>
-      </p:sp>
-      <p:pic>
-        <p:nvPicPr>
-          <p:cNvPr id="3" name="Imagem 2"/>
-          <p:cNvPicPr>
-            <a:picLocks noChangeAspect="1"/>
-          </p:cNvPicPr>
-          <p:nvPr/>
-        </p:nvPicPr>
-        <p:blipFill>
-          <a:blip r:embed="rId2">
-            <a:extLst>
-              <a:ext uri="{28A0092B-C50C-407E-A947-70E740481C1C}">
-                <a14:useLocalDpi xmlns:a14="http://schemas.microsoft.com/office/drawing/2010/main" val="0"/>
-              </a:ext>
-            </a:extLst>
-          </a:blip>
-          <a:stretch>
-            <a:fillRect/>
-          </a:stretch>
-        </p:blipFill>
-        <p:spPr>
-          <a:xfrm>
-            <a:off x="0" y="116632"/>
-            <a:ext cx="9091042" cy="6624736"/>
-          </a:xfrm>
-          <a:prstGeom prst="rect">
-            <a:avLst/>
-          </a:prstGeom>
-        </p:spPr>
-      </p:pic>
+              <a:t>Manipulação de informações</a:t>
+            </a:r>
+          </a:p>
+          <a:p>
+            <a:r>
+              <a:rPr lang="pt-BR" sz="4000" dirty="0" smtClean="0">
+                <a:latin typeface="Arial" pitchFamily="34" charset="0"/>
+                <a:cs typeface="Arial" pitchFamily="34" charset="0"/>
+              </a:rPr>
+              <a:t>Compreensível ao usuário</a:t>
+            </a:r>
+          </a:p>
+          <a:p>
+            <a:r>
+              <a:rPr lang="pt-BR" sz="4000" dirty="0" smtClean="0">
+                <a:latin typeface="Arial" pitchFamily="34" charset="0"/>
+                <a:cs typeface="Arial" pitchFamily="34" charset="0"/>
+              </a:rPr>
+              <a:t>Fluxo do Software</a:t>
+            </a:r>
+          </a:p>
+        </p:txBody>
+      </p:sp>
     </p:spTree>
     <p:extLst>
       <p:ext uri="{BB962C8B-B14F-4D97-AF65-F5344CB8AC3E}">
-        <p14:creationId xmlns:p14="http://schemas.microsoft.com/office/powerpoint/2010/main" val="647338555"/>
+        <p14:creationId xmlns:p14="http://schemas.microsoft.com/office/powerpoint/2010/main" val="580103642"/>
       </p:ext>
     </p:extLst>
   </p:cSld>
@@ -7585,94 +7539,40 @@
           <a:chExt cx="0" cy="0"/>
         </a:xfrm>
       </p:grpSpPr>
-      <p:sp>
-        <p:nvSpPr>
-          <p:cNvPr id="2" name="Título 1"/>
-          <p:cNvSpPr>
-            <a:spLocks noGrp="1"/>
-          </p:cNvSpPr>
-          <p:nvPr>
-            <p:ph type="title"/>
-          </p:nvPr>
-        </p:nvSpPr>
-        <p:spPr/>
-        <p:txBody>
-          <a:bodyPr>
-            <a:noAutofit/>
-          </a:bodyPr>
-          <a:lstStyle/>
-          <a:p>
-            <a:r>
-              <a:rPr lang="pt-BR" sz="4800" b="1" dirty="0" smtClean="0">
-                <a:solidFill>
-                  <a:schemeClr val="tx1"/>
-                </a:solidFill>
-              </a:rPr>
-              <a:t>Diagrama de Caso de Uso</a:t>
-            </a:r>
-            <a:endParaRPr lang="pt-BR" sz="4800" b="1" dirty="0">
-              <a:solidFill>
-                <a:schemeClr val="tx1"/>
-              </a:solidFill>
-            </a:endParaRPr>
-          </a:p>
-        </p:txBody>
-      </p:sp>
-      <p:sp>
-        <p:nvSpPr>
-          <p:cNvPr id="3" name="Espaço Reservado para Conteúdo 2"/>
-          <p:cNvSpPr>
-            <a:spLocks noGrp="1"/>
-          </p:cNvSpPr>
-          <p:nvPr>
-            <p:ph sz="quarter" idx="1"/>
-          </p:nvPr>
-        </p:nvSpPr>
-        <p:spPr/>
-        <p:txBody>
-          <a:bodyPr>
-            <a:normAutofit/>
-          </a:bodyPr>
-          <a:lstStyle/>
-          <a:p>
-            <a:endParaRPr lang="pt-BR" sz="3600" dirty="0" smtClean="0">
-              <a:latin typeface="Arial" pitchFamily="34" charset="0"/>
-              <a:cs typeface="Arial" pitchFamily="34" charset="0"/>
-            </a:endParaRPr>
-          </a:p>
-          <a:p>
-            <a:r>
-              <a:rPr lang="pt-BR" sz="4000" dirty="0" smtClean="0">
-                <a:latin typeface="Arial" pitchFamily="34" charset="0"/>
-                <a:cs typeface="Arial" pitchFamily="34" charset="0"/>
-              </a:rPr>
-              <a:t>Manipulação de informações</a:t>
-            </a:r>
-          </a:p>
-          <a:p>
-            <a:r>
-              <a:rPr lang="pt-BR" sz="4000" dirty="0" smtClean="0">
-                <a:latin typeface="Arial" pitchFamily="34" charset="0"/>
-                <a:cs typeface="Arial" pitchFamily="34" charset="0"/>
-              </a:rPr>
-              <a:t>Compreensível ao usuário</a:t>
-            </a:r>
-          </a:p>
-          <a:p>
-            <a:r>
-              <a:rPr lang="pt-BR" sz="4000" dirty="0" smtClean="0">
-                <a:latin typeface="Arial" pitchFamily="34" charset="0"/>
-                <a:cs typeface="Arial" pitchFamily="34" charset="0"/>
-              </a:rPr>
-              <a:t>Fluxo do Software</a:t>
-            </a:r>
-          </a:p>
-        </p:txBody>
-      </p:sp>
+      <p:pic>
+        <p:nvPicPr>
+          <p:cNvPr id="2" name="Imagem 1"/>
+          <p:cNvPicPr>
+            <a:picLocks noChangeAspect="1"/>
+          </p:cNvPicPr>
+          <p:nvPr/>
+        </p:nvPicPr>
+        <p:blipFill>
+          <a:blip r:embed="rId2">
+            <a:extLst>
+              <a:ext uri="{28A0092B-C50C-407E-A947-70E740481C1C}">
+                <a14:useLocalDpi xmlns:a14="http://schemas.microsoft.com/office/drawing/2010/main" val="0"/>
+              </a:ext>
+            </a:extLst>
+          </a:blip>
+          <a:stretch>
+            <a:fillRect/>
+          </a:stretch>
+        </p:blipFill>
+        <p:spPr>
+          <a:xfrm>
+            <a:off x="179512" y="0"/>
+            <a:ext cx="8784976" cy="6858000"/>
+          </a:xfrm>
+          <a:prstGeom prst="rect">
+            <a:avLst/>
+          </a:prstGeom>
+        </p:spPr>
+      </p:pic>
     </p:spTree>
     <p:extLst>
       <p:ext uri="{BB962C8B-B14F-4D97-AF65-F5344CB8AC3E}">
-        <p14:creationId xmlns:p14="http://schemas.microsoft.com/office/powerpoint/2010/main" val="580103642"/>
+        <p14:creationId xmlns:p14="http://schemas.microsoft.com/office/powerpoint/2010/main" val="1021795620"/>
       </p:ext>
     </p:extLst>
   </p:cSld>

</xml_diff>